<commit_message>
in the process of organizing
</commit_message>
<xml_diff>
--- a/tree_decomposition.pptx
+++ b/tree_decomposition.pptx
@@ -186,16 +186,16 @@
     </inkml:brush>
   </inkml:definitions>
   <inkml:trace contextRef="#ctx0" brushRef="#br0">10838 11856 24575,'26'0'0,"22"0"0,10 0 0,-15 0 0,2 0 0,0 0 0,2 0 0,0 0 0,-1 0 0,11 0 0,-5 0 0,-21 0 0,-2 0 0,1 0 0,3 0 0,13 0 0,5 0 0,-3 0 0,-6 0 0,0 0 0,9 0 0,5 0 0,-10 0 0,4 0 0,-7-1 0,8-1 0,-2-2 0,4-5 0,-1 0 0,-13 4 0,2 1 0,-2-2 0,12-5 0,-4-1 0,-19 3 0,0 1 0,17-2 0,1 1 0,-12 0 0,-2 0 0,5 2 0,-4 0 0,3 0 0,-7 0 0,22-1 0,8-1 0,-22 3 0,1-1 0,1 1 0,2 0 0,-3 1 0,0-1 0,-2 1 0,1 0 0,-2 0 0,14 0 0,-15 2 0,-4 0 0,-11 3 0,4-3 0,-7 3 0,17-3 0,-12 3 0,7 0 0,-16 0 0,-7 0 0,0 0 0,0 0 0,-1 0 0,6 0 0,20 0 0,6 0 0,3 0 0,-3 0 0,6 0 0,1 0 0,-2 0 0,0 0 0,-3 0 0,5 0 0,-1 0 0,16 0 0,-10 0 0,-27 0 0,27 0 0,-29 0 0,20 0 0,-20 0 0,37 0 0,-21 0 0,-4 0 0,0 0 0,4 0 0,20 3 0,-6 3 0,1 1 0,-17-2 0,-1-1 0,11 4 0,-1 1 0,-11-1 0,0 1 0,23 2 0,2 0 0,-15 0 0,0-1 0,11 1 0,-5-2 0,-15-2 0,12 0 0,-9-2 0,3 0 0,1-1 0,0-1 0,-2 1 0,-3-1 0,17 0 0,-15-3 0,-1 0 0,2 0 0,-8 0 0,0 0 0,7 0 0,-1 0 0,-5 0 0,-3 0 0,16 0 0,-10 0 0,-2 0 0,3 0 0,4 0 0,-21 0 0,14 0 0,-4 0 0,3 0 0,7 0 0,0 0 0,-2 0 0,3 0 0,11 0 0,1 0 0,-18-3 0,3-1 0,13 0 0,8-1 0,-4 1 0,-11-1 0,-3 0 0,2 1 0,5-2 0,2 0 0,-2 1 0,-4 2 0,0 0 0,-1 0 0,0-1 0,-1 0 0,-1 1 0,11 0 0,-2 0-285,4 0 1,-6 0 284,-8 3 0,-4 0 0,0 0 0,24 0 0,-24 0 0,-2 0 0,13 0 0,1 0 0,8 0 0,-11 0 0,15 0 0,-19 0 0,16 0 0,-13 0 569,3 0-569,-2 0 0,0 0 0,2 0 0,13 0 0,-10 0 0,0 0 0,7 0 0,-2 0 0,-8 0 0,-16 0 0,1 0 0,18 0 0,-17 0 0,9 0 0,-27 0 0,2 0 0,-5 0 0,-6 0 0,-1 0 0</inkml:trace>
-  <inkml:trace contextRef="#ctx0" brushRef="#br0" timeOffset="575186">17749 15603 24575,'14'0'0,"17"0"0,21 0 0,-15 0 0,8 0 0,-6 0 0,6 0 0,4 0 0,1 0 0,0 0 0,-4 0 0,1 0 0,0 0 0,2 0 0,0 0 0,0 0-1355,6 0 0,2 0 1,0 0-1,1 0 0,-3 0 1,-1 0 1354,-1 0 0,0 1 0,-3-1 0,-1 0 0,-3-1 0,11-1 0,-5-1 0,0 0-134,-4 1 0,0 1 0,-4-2 134,4-1 0,-1-1 0,-7 3 0,1-1 0,-5 1 0,19 2 0,-3-4 0,-16 3 0,1-1 0,13 1 0,-13 0 0,-2-1 0,-6 2 5511,23 0-5511,-7 0 3019,-16 0-3019,13 0 0,-16 0 0,1 0 0,20 0 0,-19 0 0,8 0 0,-5 0 0,7-3 0,8 0 0,4-1 0,-17 0 0,0 0 0,13 0 0,-4 1 0,-2 0 0,-13 0 0,1 2 0,8-2 0,6 3 0,-6 0 0,8 0 0,1 0 0,-17 0 0,2 0 0,13 0 0,0 0 0,-12 2 0,-1-1 0,1 0 0,-1-1 0,23 4 0,-17-4 0,1 0 0,-8 0 0,1 0 0,12 0 0,-4 0 0,-11 0 0,22 0 0,-30 0 0,16 0 0,-25 0 0,-1 0 0,-8 0 0,-6 0 0</inkml:trace>
-  <inkml:trace contextRef="#ctx0" brushRef="#br0" timeOffset="588470">13455 17398 24575,'39'0'0,"0"0"0,-8 0 0,2 0 0,4 0 0,4 0 0,3 0-323,-2 0 0,2 0 0,4 0 0,5 0 323,-6 0 0,3 0 0,5 0 0,2 0 0,1 0 0,1 0 0,-1 0 0,-2 0 0,-1 0 0,-1 0 0,0 0 0,0 0 0,0 0 0,1 0 0,1 0 0,0 0-772,-5 0 0,2 0 0,1 0 0,1 0 0,0 0 0,-1 0 0,-1 0 0,-2 0 0,-3 0 0,-4 0 772,14 0 0,-5 0 0,-3 0 0,-3 0 0,-1 0 0,13 0 0,-4 0 0,-10 0 1642,5 0-1642,-19 0 0,-2 0 0,-2 0 0,-14 0 0,-6 0 0,0 0 0</inkml:trace>
-  <inkml:trace contextRef="#ctx0" brushRef="#br0" timeOffset="607083">22543 15630 24575,'5'3'0,"42"-1"0,-7-2 0,10 0 0,8 0 0,6 0-522,-23 0 0,4 0 0,4 0 0,2 0 0,2 0 0,2 0 0,1 0 1,0 0-1,0 0 0,-1 0 0,-1 0 522,2 0 0,0 0 0,1 0 0,0 0 0,1 0 0,-1 0 0,0 0 0,0 0 0,0 0 0,0 0 0,-1 0-466,-3 0 1,1 0-1,0 0 1,1 0-1,-2 0 1,1 0-1,-1 0 1,-2 0-1,0 0 1,-1 0-1,-3 0 466,15 0 0,2 0 0,-1 0 0,-3 0 0,-6 0 0,-9 0 0,-10 0 0,14 0 667,-7 0 0,8 0 0,-3 0-667,-3 0 0,0 0 0,4-2 0,4 0 0,-5 0 0,-5 1 0,-4 0 0,-1-2 0,-6 0 0,-11 3 2077,3 0-2077,-7 0 6784,-1 0-6784,-12-2 0,-22-1 0,14 1 0,-15 0 0</inkml:trace>
-  <inkml:trace contextRef="#ctx0" brushRef="#br0" timeOffset="647976">16101 15072 24575,'0'-47'0,"-1"0"0,0 0 0,0 0 0,1 2 0,-1 0 0,1 1 0,-1 1 0,-1-12 0,-1 1 0,2 5-967,0-1 0,0 3 967,-2 5 0,0 6 623,3 6-623,0 16 320,0-4-320,4 15 0,26 0 0,10-3 0,-5 3 0,7 1 0,-1-1 0,8-4 0,2 1 185,-8 2 1,2-1 0,-1 2-186,11 0 0,-1 0 0,-4-1 0,4 0 0,-7 3 0,7 1 0,0 1 0,-5-2 0,-5 0 0,-4 0 0,4-1 0,1 2 0,5 0 0,-1 1 0,-2-2 0,0 1 0,-3-2 0,1 0 0,0 0 0,1 0 0,4-2 0,4-2 0,5-2 0,0 1 0,-5 0 0,-6 1 0,-5 1 0,3-1-624,11-3 0,2-1 1,-11 1 623,0 1 0,-14 4 0,1-1 0,2-2 0,4-2 0,5 2 0,6 0 0,-2-1 0,6-1 0,0-1-239,-1 0 1,3 1 0,-5 0 238,-5 4 0,-1-1 0,-8 0 0,2-1 0,2 0 125,7 2 1,1 1 0,6-1-126,-12 2 0,5 0 0,3 0 0,0 0 0,-1 0 0,-5 0-60,2 0 0,-4 1 0,0 0 0,4-1 60,0 1 0,4 0 0,2-1 0,1 1 0,-3 0 0,-3 0 0,3 1 0,-5-1 0,0 1 0,6 0 0,-8 0 0,5 0 0,2 0 0,1 1 0,-1-1 0,-1 0 0,-3 0 0,4 0 0,-3 0 0,-2 0 0,1 0 0,2 1-561,0-1 0,2 1 1,1 0-1,-1 1 0,-6-1 1,-6 0 560,12 0 0,-7 0 291,0 0 0,5 0-291,-6-1 0,6 0 0,1 0 0,-6-1 0,7 0 0,2 0 0,-12 0 0,6 0 0,3 0 0,-2 0 0,-6 0 0,-3 1 0,-4-1 0,3 1 0,0 0 0,3-1 0,2 2 0,2-1 0,4 1 0,5 0 0,1 0 0,-3 0 0,-4 0 0,1 0 0,-4 0 0,3 0-120,4 0 1,4 0 0,-1 0 0,-10 0 119,-9 0 0,-3 0 0,-1 0 0,4 0 0,4 0 0,9 0 0,7 0 0,4 0 0,-2 0 0,-6 0 0,1 0 0,-5 0 0,7 0 0,-6-1 0,6 1 0,5-1 0,-1 0 0,-3-1 0,-8-1-439,9-3 0,-7-1 0,-1 1 439,2 2 0,-1 1 0,-1-2 0,0-2 0,-1-1 0,-8 2 3078,9 5-3078,-15-1 0,5-1 0,-1 1 0,5-1 0,0 1 0,11 0 0,-2-1 0,-12 1 0,-4 1 0,12 1 268,-20 0 0,1 0-268,3 0 0,-1 0 0,-2 1 0,-2 1 0,14 1 3845,1 6-3845,-11-2 0,22 1 0,-26-2 0,2-3 0,-26-1 0,3 0 0,-5 1 0,2 2 0,-5 7 0,0 40 0,0-22 0,0 24 0,0-31 0,0-12 0,0 10 0,2-17 0,6 3 0,11-7 0,27 0 0,-2-2 0,1 1 0,-20-4 0,-6 4 0,-1-1 0,15 2 0,-14 0 0,7 0 0,-14 0 0,9 0 0,-7 0 0,2 2 0,-3 1 0,-4 2 0,4 3 0,-2 1 0,0 1 0,7 13 0,-8-9 0,7 9 0,-8-9 0,1 0 0,4 7 0,5 10 0,-3-8 0,1 4 0,-9-16 0,5 13 0,-6-12 0,6 12 0,-1 0 0,1 7 0,1 5 0,6 10 0,0 1 0,-4-6 0,0-1 0,2 1 0,-3-7 0,-10-20 0,2 1 0,-7-12 0</inkml:trace>
-  <inkml:trace contextRef="#ctx0" brushRef="#br0" timeOffset="649867">23762 13121 24575,'4'55'0,"0"1"0,0 0 0,-1-13 0,-1-1 0,2-4 0,4 0 0,0-6 0,1-1 0,-2-15 0,1 4 0,1-2 0,2 3 0,4-7 0,-6-7 0,6-4 0,-4-14 0,-2 4 0,-1-5 0,-5 7 0</inkml:trace>
-  <inkml:trace contextRef="#ctx0" brushRef="#br0" timeOffset="650550">23923 13373 24575,'0'0'0</inkml:trace>
-  <inkml:trace contextRef="#ctx0" brushRef="#br0" timeOffset="652317">24107 13180 24575,'-23'0'0,"-15"0"0,7 0 0,-1 0 0,-22 0 0,4 7 0,32-3 0,13 5 0,5-1 0,-2 0 0,-1 2 0,0 16 0,0 17 0,3-9 0,0 18 0,3-32 0,13 14 0,-1-17 0,11 2 0,1-10 0,-2-2 0,5-2 0,5-1 0,-5 0 0,0-2 0,26 2 0,-16-2 0,-37 0 0,-1 1 0,-2 2 0,0 0 0,0 5 0,-5 4 0,-5 6 0,-30 20 0,9-22 0,-7-1 0,3 0 0,0 4 0,0-2 0,-4-4 0,-4-3 0,5-3 0,6-6 0,3-3 0,-14 0 0,-2-2 0,38-1 0,-2 0 0,9-1 0,-3 3 0,3-1 0</inkml:trace>
-  <inkml:trace contextRef="#ctx0" brushRef="#br0" timeOffset="655000">24676 13199 24575,'-27'0'0,"-9"0"0,13 0 0,-8 0 0,18 0 0,-19 0 0,-5 10 0,7-6 0,4 9 0,21-5 0,0-3 0,2 2 0,1-2 0,2 0 0,0 2 0,2 4 0,11 11 0,2-2 0,11 8 0,-6-11 0,7 8 0,-1-10 0,0 0 0,4 3 0,-3-5 0,0-3 0,-1-6 0,-3 2 0,-2-3 0,-13-1 0,4 1 0,2-3 0,-3 5 0,-2-5 0,-9 3 0</inkml:trace>
-  <inkml:trace contextRef="#ctx0" brushRef="#br0" timeOffset="655571">24629 13492 24575,'0'0'0</inkml:trace>
-  <inkml:trace contextRef="#ctx0" brushRef="#br0" timeOffset="656987">24734 13522 24575,'0'19'0,"0"-6"0,-9 3 0,-2-6 0,-11 8 0,-2 0 0,-2 0 0,1-1 0,1-1 0,4-6 0,1-1 0,-1-1 0,0-4 0,4 1 0,2-5 0,-14 0 0,7 0 0,-29 0 0,22 0 0,1 0 0,17-2 0,7 1 0,3-1 0</inkml:trace>
+  <inkml:trace contextRef="#ctx0" brushRef="#br0" timeOffset="145689.27">17749 15603 24575,'14'0'0,"17"0"0,21 0 0,-15 0 0,8 0 0,-6 0 0,6 0 0,4 0 0,1 0 0,0 0 0,-4 0 0,1 0 0,0 0 0,2 0 0,0 0 0,0 0-1355,6 0 0,2 0 1,0 0-1,1 0 0,-3 0 1,-1 0 1354,-1 0 0,0 1 0,-3-1 0,-1 0 0,-3-1 0,11-1 0,-5-1 0,0 0-134,-4 1 0,0 1 0,-4-2 134,4-1 0,-1-1 0,-7 3 0,1-1 0,-5 1 0,19 2 0,-3-4 0,-16 3 0,1-1 0,13 1 0,-13 0 0,-2-1 0,-6 2 5511,23 0-5511,-7 0 3019,-16 0-3019,13 0 0,-16 0 0,1 0 0,20 0 0,-19 0 0,8 0 0,-5 0 0,7-3 0,8 0 0,4-1 0,-17 0 0,0 0 0,13 0 0,-4 1 0,-2 0 0,-13 0 0,1 2 0,8-2 0,6 3 0,-6 0 0,8 0 0,1 0 0,-17 0 0,2 0 0,13 0 0,0 0 0,-12 2 0,-1-1 0,1 0 0,-1-1 0,23 4 0,-17-4 0,1 0 0,-8 0 0,1 0 0,12 0 0,-4 0 0,-11 0 0,22 0 0,-30 0 0,16 0 0,-25 0 0,-1 0 0,-8 0 0,-6 0 0</inkml:trace>
+  <inkml:trace contextRef="#ctx0" brushRef="#br0" timeOffset="158973.27">13455 17398 24575,'39'0'0,"0"0"0,-8 0 0,2 0 0,4 0 0,4 0 0,3 0-323,-2 0 0,2 0 0,4 0 0,5 0 323,-6 0 0,3 0 0,5 0 0,2 0 0,1 0 0,1 0 0,-1 0 0,-2 0 0,-1 0 0,-1 0 0,0 0 0,0 0 0,0 0 0,1 0 0,1 0 0,0 0-772,-5 0 0,2 0 0,1 0 0,1 0 0,0 0 0,-1 0 0,-1 0 0,-2 0 0,-3 0 0,-4 0 772,14 0 0,-5 0 0,-3 0 0,-3 0 0,-1 0 0,13 0 0,-4 0 0,-10 0 1642,5 0-1642,-19 0 0,-2 0 0,-2 0 0,-14 0 0,-6 0 0,0 0 0</inkml:trace>
+  <inkml:trace contextRef="#ctx0" brushRef="#br0" timeOffset="177586.27">22543 15630 24575,'5'3'0,"42"-1"0,-7-2 0,10 0 0,8 0 0,6 0-522,-23 0 0,4 0 0,4 0 0,2 0 0,2 0 0,2 0 0,1 0 1,0 0-1,0 0 0,-1 0 0,-1 0 522,2 0 0,0 0 0,1 0 0,0 0 0,1 0 0,-1 0 0,0 0 0,0 0 0,0 0 0,0 0 0,-1 0-466,-3 0 1,1 0-1,0 0 1,1 0-1,-2 0 1,1 0-1,-1 0 1,-2 0-1,0 0 1,-1 0-1,-3 0 466,15 0 0,2 0 0,-1 0 0,-3 0 0,-6 0 0,-9 0 0,-10 0 0,14 0 667,-7 0 0,8 0 0,-3 0-667,-3 0 0,0 0 0,4-2 0,4 0 0,-5 0 0,-5 1 0,-4 0 0,-1-2 0,-6 0 0,-11 3 2077,3 0-2077,-7 0 6784,-1 0-6784,-12-2 0,-22-1 0,14 1 0,-15 0 0</inkml:trace>
+  <inkml:trace contextRef="#ctx0" brushRef="#br0" timeOffset="-211017.46">16101 15072 24575,'0'-47'0,"-1"0"0,0 0 0,0 0 0,1 2 0,-1 0 0,1 1 0,-1 1 0,-1-12 0,-1 1 0,2 5-967,0-1 0,0 3 967,-2 5 0,0 6 623,3 6-623,0 16 320,0-4-320,4 15 0,26 0 0,10-3 0,-5 3 0,7 1 0,-1-1 0,8-4 0,2 1 185,-8 2 1,2-1 0,-1 2-186,11 0 0,-1 0 0,-4-1 0,4 0 0,-7 3 0,7 1 0,0 1 0,-5-2 0,-5 0 0,-4 0 0,4-1 0,1 2 0,5 0 0,-1 1 0,-2-2 0,0 1 0,-3-2 0,1 0 0,0 0 0,1 0 0,4-2 0,4-2 0,5-2 0,0 1 0,-5 0 0,-6 1 0,-5 1 0,3-1-624,11-3 0,2-1 1,-11 1 623,0 1 0,-14 4 0,1-1 0,2-2 0,4-2 0,5 2 0,6 0 0,-2-1 0,6-1 0,0-1-239,-1 0 1,3 1 0,-5 0 238,-5 4 0,-1-1 0,-8 0 0,2-1 0,2 0 125,7 2 1,1 1 0,6-1-126,-12 2 0,5 0 0,3 0 0,0 0 0,-1 0 0,-5 0-60,2 0 0,-4 1 0,0 0 0,4-1 60,0 1 0,4 0 0,2-1 0,1 1 0,-3 0 0,-3 0 0,3 1 0,-5-1 0,0 1 0,6 0 0,-8 0 0,5 0 0,2 0 0,1 1 0,-1-1 0,-1 0 0,-3 0 0,4 0 0,-3 0 0,-2 0 0,1 0 0,2 1-561,0-1 0,2 1 1,1 0-1,-1 1 0,-6-1 1,-6 0 560,12 0 0,-7 0 291,0 0 0,5 0-291,-6-1 0,6 0 0,1 0 0,-6-1 0,7 0 0,2 0 0,-12 0 0,6 0 0,3 0 0,-2 0 0,-6 0 0,-3 1 0,-4-1 0,3 1 0,0 0 0,3-1 0,2 2 0,2-1 0,4 1 0,5 0 0,1 0 0,-3 0 0,-4 0 0,1 0 0,-4 0 0,3 0-120,4 0 1,4 0 0,-1 0 0,-10 0 119,-9 0 0,-3 0 0,-1 0 0,4 0 0,4 0 0,9 0 0,7 0 0,4 0 0,-2 0 0,-6 0 0,1 0 0,-5 0 0,7 0 0,-6-1 0,6 1 0,5-1 0,-1 0 0,-3-1 0,-8-1-439,9-3 0,-7-1 0,-1 1 439,2 2 0,-1 1 0,-1-2 0,0-2 0,-1-1 0,-8 2 3078,9 5-3078,-15-1 0,5-1 0,-1 1 0,5-1 0,0 1 0,11 0 0,-2-1 0,-12 1 0,-4 1 0,12 1 268,-20 0 0,1 0-268,3 0 0,-1 0 0,-2 1 0,-2 1 0,14 1 3845,1 6-3845,-11-2 0,22 1 0,-26-2 0,2-3 0,-26-1 0,3 0 0,-5 1 0,2 2 0,-5 7 0,0 40 0,0-22 0,0 24 0,0-31 0,0-12 0,0 10 0,2-17 0,6 3 0,11-7 0,27 0 0,-2-2 0,1 1 0,-20-4 0,-6 4 0,-1-1 0,15 2 0,-14 0 0,7 0 0,-14 0 0,9 0 0,-7 0 0,2 2 0,-3 1 0,-4 2 0,4 3 0,-2 1 0,0 1 0,7 13 0,-8-9 0,7 9 0,-8-9 0,1 0 0,4 7 0,5 10 0,-3-8 0,1 4 0,-9-16 0,5 13 0,-6-12 0,6 12 0,-1 0 0,1 7 0,1 5 0,6 10 0,0 1 0,-4-6 0,0-1 0,2 1 0,-3-7 0,-10-20 0,2 1 0,-7-12 0</inkml:trace>
+  <inkml:trace contextRef="#ctx0" brushRef="#br0" timeOffset="-209126.46">23762 13121 24575,'4'55'0,"0"1"0,0 0 0,-1-13 0,-1-1 0,2-4 0,4 0 0,0-6 0,1-1 0,-2-15 0,1 4 0,1-2 0,2 3 0,4-7 0,-6-7 0,6-4 0,-4-14 0,-2 4 0,-1-5 0,-5 7 0</inkml:trace>
+  <inkml:trace contextRef="#ctx0" brushRef="#br0" timeOffset="-208443.46">23923 13373 24575,'0'0'0</inkml:trace>
+  <inkml:trace contextRef="#ctx0" brushRef="#br0" timeOffset="-206676.46">24107 13180 24575,'-23'0'0,"-15"0"0,7 0 0,-1 0 0,-22 0 0,4 7 0,32-3 0,13 5 0,5-1 0,-2 0 0,-1 2 0,0 16 0,0 17 0,3-9 0,0 18 0,3-32 0,13 14 0,-1-17 0,11 2 0,1-10 0,-2-2 0,5-2 0,5-1 0,-5 0 0,0-2 0,26 2 0,-16-2 0,-37 0 0,-1 1 0,-2 2 0,0 0 0,0 5 0,-5 4 0,-5 6 0,-30 20 0,9-22 0,-7-1 0,3 0 0,0 4 0,0-2 0,-4-4 0,-4-3 0,5-3 0,6-6 0,3-3 0,-14 0 0,-2-2 0,38-1 0,-2 0 0,9-1 0,-3 3 0,3-1 0</inkml:trace>
+  <inkml:trace contextRef="#ctx0" brushRef="#br0" timeOffset="-203993.46">24676 13199 24575,'-27'0'0,"-9"0"0,13 0 0,-8 0 0,18 0 0,-19 0 0,-5 10 0,7-6 0,4 9 0,21-5 0,0-3 0,2 2 0,1-2 0,2 0 0,0 2 0,2 4 0,11 11 0,2-2 0,11 8 0,-6-11 0,7 8 0,-1-10 0,0 0 0,4 3 0,-3-5 0,0-3 0,-1-6 0,-3 2 0,-2-3 0,-13-1 0,4 1 0,2-3 0,-3 5 0,-2-5 0,-9 3 0</inkml:trace>
+  <inkml:trace contextRef="#ctx0" brushRef="#br0" timeOffset="-203422.46">24629 13492 24575,'0'0'0</inkml:trace>
+  <inkml:trace contextRef="#ctx0" brushRef="#br0" timeOffset="-202006.46">24734 13522 24575,'0'19'0,"0"-6"0,-9 3 0,-2-6 0,-11 8 0,-2 0 0,-2 0 0,1-1 0,1-1 0,4-6 0,1-1 0,-1-1 0,0-4 0,4 1 0,2-5 0,-14 0 0,7 0 0,-29 0 0,22 0 0,1 0 0,17-2 0,7 1 0,3-1 0</inkml:trace>
 </inkml:ink>
 </file>
 
@@ -238,15 +238,15 @@
   <inkml:trace contextRef="#ctx0" brushRef="#br0" timeOffset="155301">10583 11693 24575,'30'0'0,"0"0"0,4 0 0,3 0 0,11 1 0,4-2 0,-5-2 0,3-1 0,-5 0 0,-4 1 0,-2-1-779,-1-1 0,2-1 1,-4 1 778,19 0 0,-2-2 747,-10 6-747,0-3 0,2 1 0,-10 2 0,-1 1 0,9-2 0,-2 0 385,11 2-385,-23 0 0,-3 0 0,-3 0 1204,-9 0-1204,-13 0 0,-34 4 0,6-1 0,-8 2 0,-10 2 0,-11 2 0,-2 0 0,3 0 0,11-3 0,2 0 0,0 1 0,-2-1-736,-9 3 1,-2 0 0,1 0 0,6-1 735,-12 1 0,12-2 0,4 1 0,-2 2 0,7-5 0,12 0 0,7-5 0,15 0 0,-2 0 2941,-5 0-2941,-8 0 0,-16 0 0,0 0 0,-10 0 0,-7 0 0,-1-3 0,20 0 0,2-1 0,-8 0 0,10-5 0,22 9 0,3-3 0,2 3 0,1 0 0</inkml:trace>
   <inkml:trace contextRef="#ctx0" brushRef="#br0" timeOffset="160939">15082 11343 24575,'0'23'0,"0"15"0,0 7 0,0-4 0,0 1 0,0 14 0,0-2 0,0-18 0,0-4 0,0 4 0,0-17 0,0 12 0,0 3 0,3 17 0,-3 5 0,3-22 0,-3 0 0,0-26 0,0 0 0,0-5 0,0-23 0,0-9 0,0-4 0,0-24 0,0 22 0,0 2 0,0 2 0,6 3 0,5-8 0,0 11 0,5-10 0,-7 23 0,17-16 0,6 6 0,-1 1 0,1 4 0,-20 13 0,11-4 0,8 7 0,-10-2 0,4 3 0,-17 0 0,3 25 0,-5-5 0,1 14 0,-7 2 0,0 2 0,0 16 0,0-13 0,0 0 0,0-10 0,0-8 0,0 0 0,0-10 0,-3 16 0,3-4 0,-3 12 0,0 3 0,2-10 0,-2 1 0,1-15 0,1-12 0,-1-3 0,2 1 0</inkml:trace>
   <inkml:trace contextRef="#ctx0" brushRef="#br0" timeOffset="203389">14407 7254 24575,'-2'-4'0,"-1"31"0,3 12 0,0 9 0,0-11 0,0 2 0,0-1 0,0 15 0,0 0 0,0 4 0,0-5 0,0-4 0,0 3 0,0 1 0,0-19 0,0-3 0,0 7 0,0-3 0,0 2 0,0 0 0,0 3 0,0 1 0,0-7 0,0-9 0,0-8 0,0 17 0,0-18 0,-2 10 0,0-21 0,-14-21 0,-4-11 0,0 4 0,-3-8 0,1-1 0,-1 2 0,2 2 0,-4-2 0,3 5 0,-1 1 0,-1-1 0,-1 2 0,-5 2 0,-3 6 0,1 11 0,-1 4 0,4-4 0,0 1 0,-13 6 0,3 2 0,8 4 0,-2 2 0,1 2 0,-7 11 0,-7 3 0,23-6 0,15-9 0,3 3 0,4 4 0,0 11 0,-1 3 0,2 6 0,0-5 0,0-1 0,0-5 0,3 14 0,10-10 0,22 9 0,-2-21 0,11-4 0,-17-8 0,25-4 0,-6 0 0,9-3 0,-15 0 0,-1 0 0,8-8 0,-1 0 0,-9-2 0,-15-1 0,-8 8 0,-5-3 0,-2 4 0</inkml:trace>
-  <inkml:trace contextRef="#ctx0" brushRef="#br0" timeOffset="249437">10872 2744 24575,'47'0'0,"-1"0"0,1 0 0,0 0 0,-2 0 0,3 0 0,4 0 0,0 0 0,0 0 0,-2 0 0,-5 0-934,10 0 0,-5 0 0,-1 0 0,5 0 934,-2 0 0,6 0 0,3 0 0,-4-1 0,-7 2 0,-12-1 0,15 4 581,-15-1 0,-2 2-581,-1 5 612,-14 1-612,-16-6 0,-4-5 0,1 0 0,-4-2 0</inkml:trace>
-  <inkml:trace contextRef="#ctx0" brushRef="#br0" timeOffset="1.49418E6">11432 7178 24575,'41'0'0,"-14"0"0,1 0 0,4 0 0,15 0 0,-14 0 0,1 0 0,-1 0 0,-2 0 0,22 0 0,-27 0 0,-60 0 0,-8 0 0,3 2 0,-1 2 0,-8 1 0,-5 4 0,22-2 0,-14-4 0,24 0 0,-3-3 0,22 0 0,-1 0 0</inkml:trace>
-  <inkml:trace contextRef="#ctx0" brushRef="#br0" timeOffset="1.66756E6">10304 7095 24575,'0'-26'0,"6"-12"0,3 4 0,2-3 0,5-12 0,3-6 0,-4 15 0,0-3 0,2-2 0,1 1 0,0 0 0,2 0 0,1 0 0,-2 1-315,3-9 0,-2 1 0,3 1 315,3 3 0,1 1 0,-3 7 116,-5 10 0,0 0-116,9-11 0,5-6 0,0 0 0,-7 9 0,1-1 0,0 0 0,-1 1-203,-1 2 0,-1 2 0,1-2 1,1-2 202,4-4 0,3-5 0,1-1 0,-2 3 0,-4 5 0,-5 5 0,-2 4 0,2-4 0,7-6 0,4-6 0,2-2 0,-1 2 0,-6 7 0,5-8 0,0 3 0,-4 6 0,3-5 0,1 1 0,-1 2 0,0 1 0,-1 3 0,0 0 0,-2 0 0,-1 0 0,1 2 0,-1 2 0,1 2 0,-3 0 0,4-6 0,-3 2 0,-5 11 0,1-1 0,9-12 0,4-5 0,-3 4 0,-2 2 0,-1 1 0,1-2 0,3-2 0,-4 3 341,-1 1 1,-2 1-342,9-9 0,0-1 0,-3 3 0,-1 0 0,-3 5 0,-2 0 0,2-3 0,-4 2 0,-2 1 420,-2 3 1,2-1-421,-6 6 0,-1 2 0,14-14 0,-12 12 0,-1 3 0,3 3 0,6-16 0,-3 8 0,-1 0 0,10-13 0,-7 9 0,0 2 0,1 3 0,5-7 0,2-5 0,5 0 0,-13 8 0,1 7 0,-18 17 0,4-3 0,5-5 0,-5 6 0,9-7 0,-16 16 0,7-6 0,-5 4 0,8-5 0,0 2 0,9-5 0,-7 5 0,0 0 0,-2 1 0,-6 5 0,2-3 0,-7 3 0,-2 3 0,-1-1 0,-2 12 0,0 13 0,0 9 0,0 2 0,0 5 0,0-2 0,0 12 0,0-2 0,0-10 0,0 1 0,0-6 0,0 18 0,0-1 0,-3 3 0,0-25 0,0-3 0,-1 5 0,-5 1 0,8-21 0,-4 10 0,1 27 0,1-14 0,-3 20 0,5-28 0,-2 3 0,3-2 0,0 27 0,0-13 0,0 1 0,0-3 0,0 0 0,0 3 0,0-3 0,0-1 0,0-9 0,0 2 0,0 22 0,0-24 0,0 0 0,0 2 0,0-1 0,-3 16 0,2-10 0,-5-14 0,2 6 0,-2 5 0,-3 0 0,-1 0 0,2 4 0,-1 0 0,-2 3 0,-1-1 0,1-9 0,0 1 0,-5 12 0,-2 4 0,2-8 0,-2 2 0,2-3 0,-4 5 0,1 0-380,4-8 1,-1 2 0,2-6 379,-6 8 0,6-7 0,-2 0 0,-9 9-86,6-7 1,-3 7 0,-1 0 85,0-3 0,0 0 0,-1 5 0,2-6 0,0 5 0,-1 2 0,0-2 0,2-3 0,-5 8 0,2-3 0,-1 0 0,-1 5 0,0 0 0,2-5 0,5-7 0,1-1 0,-1-3 0,-1 2 0,0-1 0,-7 14 0,0-2 0,-1-1 0,1-4 0,9-14 0,1-5 0,1-5 1123,0 1-1123,-3 8 0,-1-6 0,0 2 0,-3 6 271,-13 14-271,18-23 0,-16 21 0,12-16 0,-8 9 0,18-20 0,1-3 0,-10 12 0,4-10 0,-22 21 0,10-13 0,1-2 0,-14 14 0,14-14 0,2-2 0,-1-2 0,-1-2 0,-3 2 0,3-2 0,-1 0 0,-2 1 0,0-1 0,-21 10 0,9-7 0,-5-1 0,-1 1 0,19-6 0,1-2-247,-17 5 1,2-2 246,11-4 0,5-3 0,-2 1 0,-1 0 0,-2-1 0,-9 1 0,-5-1 0,2-1 0,-2 1 0,2-1 0,-9 0 0,5-1 0,5-6 0,13-7 493,9 0-493,-1-4 0,-3-3 0,1-1 0,1-1 0,-17-16 0,0 2 0,19 1 0,5 5 0,0 0 0,2-1 0,-1-8 0,5 8 0,1-1 0,5-10 0,2 10 0,0-1 0,3-10 0,0-9 0,0 12 0,0 13 0,0-1 0,2 19 0,-1 1 0,1 3 0</inkml:trace>
-  <inkml:trace contextRef="#ctx0" brushRef="#br0" timeOffset="1.67111E6">12572 6353 24575,'5'52'0,"-1"0"0,2-15 0,2 3 0,2 9 0,4 6 0,2 2 0,3-9 0,2 2 0,2 0 0,0 0 0,-3-2 0,0 0 0,1 1 0,2 0 0,0-3 0,3 2 0,0 0 0,-1-3 0,-2-4 0,-1 2 0,-1-4 0,0-3 0,10 7 0,-1-4 0,-12-15 0,1 0 0,10 7 0,0 1 0,-5-4 0,-1 0 0,0-1 0,5 1 0,8-1 0,8 3 0,0-1 0,-6-6 0,-7-4 0,0-2-536,8 7 1,8 6 0,0-3 0,-9-9 535,11-14-256,0-2 0,4-4 256,0-11 0,0-4 0,-11 8 0,0-1 0,-1-3-689,-4-5 1,-2-4 0,-2 1 688,5-5 0,-2-3 0,-3 2 0,1-4 0,-1 0-237,0-2 0,-2 0 0,1-2 237,0-1 0,0-3 0,-1-2 0,-4 3 0,0-3 0,-2 0 0,-2 3 0,2-13 0,-4 2 585,-3 10 1,0-1-1,-4 3-585,-3 0 0,-5 2 241,-1 0 1,-4-3-242,-5-8 0,-3-7 0,-3 3 0,-2 9 0,-2 2 0,-2-2 385,-2-8 0,-1-2 1,-6 3-386,-9 4 0,-7 3 0,2 3 0,11 12 0,2 1 0,-8-3 0,2 2 0,-8-5 0,-5-3 0,-2-1 0,-2-1 0,2 2 0,2 2 0,6 4-1338,-6-4 0,4 5 0,1 0 1,-6-4 1337,9 5 0,-5-2 0,-2-3 0,-2-1 0,1 1 0,1 1 0,4 2 0,4 4 0,-17-10 0,7 6 0,0-1-325,1 1 1,2 0-1,-2-1 325,7 5 0,0-1 0,0 1 0,0 0 0,-11-7 0,1 1 0,0-1 0,9 7 0,-1-1 0,1 0 0,3 3 0,1 0 0,3 2 0,1 1 146,-9-6 0,9 6 0,18 11 0,11 8 0</inkml:trace>
-  <inkml:trace contextRef="#ctx0" brushRef="#br0" timeOffset="2.24318E6">1909 79 24575,'0'0'0</inkml:trace>
-  <inkml:trace contextRef="#ctx0" brushRef="#br0" timeOffset="2.25839E6">1909 79 24575,'0'0'0</inkml:trace>
-  <inkml:trace contextRef="#ctx0" brushRef="#br0" timeOffset="2.26743E6">1909 79 24575,'0'0'0</inkml:trace>
-  <inkml:trace contextRef="#ctx0" brushRef="#br0" timeOffset="2.28387E6">1909 79 24575,'0'0'0</inkml:trace>
-  <inkml:trace contextRef="#ctx0" brushRef="#br0" timeOffset="2.38219E6">4139 6270 24575,'40'0'0,"-18"0"0,16 2 0,-31-1 0,-12 8 0,-3-3 0,-3 5 0,2-4 0,-4 1 0,-1 6 0,-3 0 0,5 0 0,3-7 0,8-2 0,-3-5 0,1 3 0,-2-3 0,0 0 0,0 0 0,-2 0 0,2-2 0,0-1 0,0-5 0,2 3 0,0-5 0,1 4 0,2-1 0,2 2 0,1 3 0,2-1 0,2 3 0,1 0 0,-1 0 0,3 0 0,-2 0 0,0 0 0,4 3 0,-4-3 0,7 7 0,-6-4 0,0 2 0,-1 0 0,-3-2 0,3 2 0,-3 0 0,0 0 0,-3 0 0,1 0 0,-3-1 0,-2-1 0,-6-1 0,2-2 0,-9-2 0,1-6 0,-3-1 0,-1-8 0,5 3 0,5 1 0,1 2 0,7 5 0,-2-1 0,2 2 0,0 0 0,0 1 0,4-1 0,1 0 0,3 2 0,-1 1 0,3 2 0,-4 0 0,11 0 0,-6 0 0,2 0 0,-1 0 0,-6 0 0,8 0 0,-7 0 0,5 4 0,-9 0 0,-1 3 0,0-4 0,-1 8 0,1-7 0,-2 8 0,0-7 0,0 0 0,0 2 0,0-2 0,-2 0 0,-1-1 0,-6-3 0,3 1 0,-6-2 0,6 0 0,-1 0 0,2 0 0,-5 0 0,5 0 0,-2 0 0</inkml:trace>
+  <inkml:trace contextRef="#ctx0" brushRef="#br0" timeOffset="-180059.73">10872 2744 24575,'47'0'0,"-1"0"0,1 0 0,0 0 0,-2 0 0,3 0 0,4 0 0,0 0 0,0 0 0,-2 0 0,-5 0-934,10 0 0,-5 0 0,-1 0 0,5 0 934,-2 0 0,6 0 0,3 0 0,-4-1 0,-7 2 0,-12-1 0,15 4 581,-15-1 0,-2 2-581,-1 5 612,-14 1-612,-16-6 0,-4-5 0,1 0 0,-4-2 0</inkml:trace>
+  <inkml:trace contextRef="#ctx0" brushRef="#br0" timeOffset="205689.81">11432 7178 24575,'41'0'0,"-14"0"0,1 0 0,4 0 0,15 0 0,-14 0 0,1 0 0,-1 0 0,-2 0 0,22 0 0,-27 0 0,-60 0 0,-8 0 0,3 2 0,-1 2 0,-8 1 0,-5 4 0,22-2 0,-14-4 0,24 0 0,-3-3 0,22 0 0,-1 0 0</inkml:trace>
+  <inkml:trace contextRef="#ctx0" brushRef="#br0" timeOffset="-50426.92">10304 7095 24575,'0'-26'0,"6"-12"0,3 4 0,2-3 0,5-12 0,3-6 0,-4 15 0,0-3 0,2-2 0,1 1 0,0 0 0,2 0 0,1 0 0,-2 1-315,3-9 0,-2 1 0,3 1 315,3 3 0,1 1 0,-3 7 116,-5 10 0,0 0-116,9-11 0,5-6 0,0 0 0,-7 9 0,1-1 0,0 0 0,-1 1-203,-1 2 0,-1 2 0,1-2 1,1-2 202,4-4 0,3-5 0,1-1 0,-2 3 0,-4 5 0,-5 5 0,-2 4 0,2-4 0,7-6 0,4-6 0,2-2 0,-1 2 0,-6 7 0,5-8 0,0 3 0,-4 6 0,3-5 0,1 1 0,-1 2 0,0 1 0,-1 3 0,0 0 0,-2 0 0,-1 0 0,1 2 0,-1 2 0,1 2 0,-3 0 0,4-6 0,-3 2 0,-5 11 0,1-1 0,9-12 0,4-5 0,-3 4 0,-2 2 0,-1 1 0,1-2 0,3-2 0,-4 3 341,-1 1 1,-2 1-342,9-9 0,0-1 0,-3 3 0,-1 0 0,-3 5 0,-2 0 0,2-3 0,-4 2 0,-2 1 420,-2 3 1,2-1-421,-6 6 0,-1 2 0,14-14 0,-12 12 0,-1 3 0,3 3 0,6-16 0,-3 8 0,-1 0 0,10-13 0,-7 9 0,0 2 0,1 3 0,5-7 0,2-5 0,5 0 0,-13 8 0,1 7 0,-18 17 0,4-3 0,5-5 0,-5 6 0,9-7 0,-16 16 0,7-6 0,-5 4 0,8-5 0,0 2 0,9-5 0,-7 5 0,0 0 0,-2 1 0,-6 5 0,2-3 0,-7 3 0,-2 3 0,-1-1 0,-2 12 0,0 13 0,0 9 0,0 2 0,0 5 0,0-2 0,0 12 0,0-2 0,0-10 0,0 1 0,0-6 0,0 18 0,0-1 0,-3 3 0,0-25 0,0-3 0,-1 5 0,-5 1 0,8-21 0,-4 10 0,1 27 0,1-14 0,-3 20 0,5-28 0,-2 3 0,3-2 0,0 27 0,0-13 0,0 1 0,0-3 0,0 0 0,0 3 0,0-3 0,0-1 0,0-9 0,0 2 0,0 22 0,0-24 0,0 0 0,0 2 0,0-1 0,-3 16 0,2-10 0,-5-14 0,2 6 0,-2 5 0,-3 0 0,-1 0 0,2 4 0,-1 0 0,-2 3 0,-1-1 0,1-9 0,0 1 0,-5 12 0,-2 4 0,2-8 0,-2 2 0,2-3 0,-4 5 0,1 0-380,4-8 1,-1 2 0,2-6 379,-6 8 0,6-7 0,-2 0 0,-9 9-86,6-7 1,-3 7 0,-1 0 85,0-3 0,0 0 0,-1 5 0,2-6 0,0 5 0,-1 2 0,0-2 0,2-3 0,-5 8 0,2-3 0,-1 0 0,-1 5 0,0 0 0,2-5 0,5-7 0,1-1 0,-1-3 0,-1 2 0,0-1 0,-7 14 0,0-2 0,-1-1 0,1-4 0,9-14 0,1-5 0,1-5 1123,0 1-1123,-3 8 0,-1-6 0,0 2 0,-3 6 271,-13 14-271,18-23 0,-16 21 0,12-16 0,-8 9 0,18-20 0,1-3 0,-10 12 0,4-10 0,-22 21 0,10-13 0,1-2 0,-14 14 0,14-14 0,2-2 0,-1-2 0,-1-2 0,-3 2 0,3-2 0,-1 0 0,-2 1 0,0-1 0,-21 10 0,9-7 0,-5-1 0,-1 1 0,19-6 0,1-2-247,-17 5 1,2-2 246,11-4 0,5-3 0,-2 1 0,-1 0 0,-2-1 0,-9 1 0,-5-1 0,2-1 0,-2 1 0,2-1 0,-9 0 0,5-1 0,5-6 0,13-7 493,9 0-493,-1-4 0,-3-3 0,1-1 0,1-1 0,-17-16 0,0 2 0,19 1 0,5 5 0,0 0 0,2-1 0,-1-8 0,5 8 0,1-1 0,5-10 0,2 10 0,0-1 0,3-10 0,0-9 0,0 12 0,0 13 0,0-1 0,2 19 0,-1 1 0,1 3 0</inkml:trace>
+  <inkml:trace contextRef="#ctx0" brushRef="#br0" timeOffset="-46876.92">12572 6353 24575,'5'52'0,"-1"0"0,2-15 0,2 3 0,2 9 0,4 6 0,2 2 0,3-9 0,2 2 0,2 0 0,0 0 0,-3-2 0,0 0 0,1 1 0,2 0 0,0-3 0,3 2 0,0 0 0,-1-3 0,-2-4 0,-1 2 0,-1-4 0,0-3 0,10 7 0,-1-4 0,-12-15 0,1 0 0,10 7 0,0 1 0,-5-4 0,-1 0 0,0-1 0,5 1 0,8-1 0,8 3 0,0-1 0,-6-6 0,-7-4 0,0-2-536,8 7 1,8 6 0,0-3 0,-9-9 535,11-14-256,0-2 0,4-4 256,0-11 0,0-4 0,-11 8 0,0-1 0,-1-3-689,-4-5 1,-2-4 0,-2 1 688,5-5 0,-2-3 0,-3 2 0,1-4 0,-1 0-237,0-2 0,-2 0 0,1-2 237,0-1 0,0-3 0,-1-2 0,-4 3 0,0-3 0,-2 0 0,-2 3 0,2-13 0,-4 2 585,-3 10 1,0-1-1,-4 3-585,-3 0 0,-5 2 241,-1 0 1,-4-3-242,-5-8 0,-3-7 0,-3 3 0,-2 9 0,-2 2 0,-2-2 385,-2-8 0,-1-2 1,-6 3-386,-9 4 0,-7 3 0,2 3 0,11 12 0,2 1 0,-8-3 0,2 2 0,-8-5 0,-5-3 0,-2-1 0,-2-1 0,2 2 0,2 2 0,6 4-1338,-6-4 0,4 5 0,1 0 1,-6-4 1337,9 5 0,-5-2 0,-2-3 0,-2-1 0,1 1 0,1 1 0,4 2 0,4 4 0,-17-10 0,7 6 0,0-1-325,1 1 1,2 0-1,-2-1 325,7 5 0,0-1 0,0 1 0,0 0 0,-11-7 0,1 1 0,0-1 0,9 7 0,-1-1 0,1 0 0,3 3 0,1 0 0,3 2 0,1 1 146,-9-6 0,9 6 0,18 11 0,11 8 0</inkml:trace>
+  <inkml:trace contextRef="#ctx0" brushRef="#br0" timeOffset="95696.35">1909 79 24575,'0'0'0</inkml:trace>
+  <inkml:trace contextRef="#ctx0" brushRef="#br0" timeOffset="110906.35">1909 79 24575,'0'0'0</inkml:trace>
+  <inkml:trace contextRef="#ctx0" brushRef="#br0" timeOffset="119946.35">1909 79 24575,'0'0'0</inkml:trace>
+  <inkml:trace contextRef="#ctx0" brushRef="#br0" timeOffset="136386.35">1909 79 24575,'0'0'0</inkml:trace>
+  <inkml:trace contextRef="#ctx0" brushRef="#br0" timeOffset="-194790.38">4139 6270 24575,'40'0'0,"-18"0"0,16 2 0,-31-1 0,-12 8 0,-3-3 0,-3 5 0,2-4 0,-4 1 0,-1 6 0,-3 0 0,5 0 0,3-7 0,8-2 0,-3-5 0,1 3 0,-2-3 0,0 0 0,0 0 0,-2 0 0,2-2 0,0-1 0,0-5 0,2 3 0,0-5 0,1 4 0,2-1 0,2 2 0,1 3 0,2-1 0,2 3 0,1 0 0,-1 0 0,3 0 0,-2 0 0,0 0 0,4 3 0,-4-3 0,7 7 0,-6-4 0,0 2 0,-1 0 0,-3-2 0,3 2 0,-3 0 0,0 0 0,-3 0 0,1 0 0,-3-1 0,-2-1 0,-6-1 0,2-2 0,-9-2 0,1-6 0,-3-1 0,-1-8 0,5 3 0,5 1 0,1 2 0,7 5 0,-2-1 0,2 2 0,0 0 0,0 1 0,4-1 0,1 0 0,3 2 0,-1 1 0,3 2 0,-4 0 0,11 0 0,-6 0 0,2 0 0,-1 0 0,-6 0 0,8 0 0,-7 0 0,5 4 0,-9 0 0,-1 3 0,0-4 0,-1 8 0,1-7 0,-2 8 0,0-7 0,0 0 0,0 2 0,0-2 0,-2 0 0,-1-1 0,-6-3 0,3 1 0,-6-2 0,6 0 0,-1 0 0,2 0 0,-5 0 0,5 0 0,-2 0 0</inkml:trace>
 </inkml:ink>
 </file>
 
@@ -332,7 +332,7 @@
           <a:p>
             <a:fld id="{78116A9A-491F-5B49-927E-D5D91EE152BA}" type="datetimeFigureOut">
               <a:rPr lang="en-US" smtClean="0"/>
-              <a:t>11/11/20</a:t>
+              <a:t>12/12/20</a:t>
             </a:fld>
             <a:endParaRPr lang="en-US"/>
           </a:p>
@@ -762,7 +762,7 @@
           <a:p>
             <a:fld id="{1160EA64-D806-43AC-9DF2-F8C432F32B4C}" type="datetimeFigureOut">
               <a:rPr lang="en-US" dirty="0"/>
-              <a:t>11/11/20</a:t>
+              <a:t>12/12/20</a:t>
             </a:fld>
             <a:endParaRPr lang="en-US" dirty="0"/>
           </a:p>
@@ -928,7 +928,7 @@
           <a:p>
             <a:fld id="{E9F9C37B-1D36-470B-8223-D6C91242EC14}" type="datetimeFigureOut">
               <a:rPr lang="en-US" dirty="0"/>
-              <a:t>11/11/20</a:t>
+              <a:t>12/12/20</a:t>
             </a:fld>
             <a:endParaRPr lang="en-US" dirty="0"/>
           </a:p>
@@ -1103,7 +1103,7 @@
           <a:p>
             <a:fld id="{67C6F52A-A82B-47A2-A83A-8C4C91F2D59F}" type="datetimeFigureOut">
               <a:rPr lang="en-US" dirty="0"/>
-              <a:t>11/11/20</a:t>
+              <a:t>12/12/20</a:t>
             </a:fld>
             <a:endParaRPr lang="en-US" dirty="0"/>
           </a:p>
@@ -1268,7 +1268,7 @@
           <a:p>
             <a:fld id="{F070A7B3-6521-4DCA-87E5-044747A908C1}" type="datetimeFigureOut">
               <a:rPr lang="en-US" dirty="0"/>
-              <a:t>11/11/20</a:t>
+              <a:t>12/12/20</a:t>
             </a:fld>
             <a:endParaRPr lang="en-US" dirty="0"/>
           </a:p>
@@ -1532,7 +1532,7 @@
           <a:p>
             <a:fld id="{1160EA64-D806-43AC-9DF2-F8C432F32B4C}" type="datetimeFigureOut">
               <a:rPr lang="en-US" dirty="0"/>
-              <a:t>11/11/20</a:t>
+              <a:t>12/12/20</a:t>
             </a:fld>
             <a:endParaRPr lang="en-US" dirty="0"/>
           </a:p>
@@ -1760,7 +1760,7 @@
           <a:p>
             <a:fld id="{AB134690-1557-4C89-A502-4959FE7FAD70}" type="datetimeFigureOut">
               <a:rPr lang="en-US" dirty="0"/>
-              <a:t>11/11/20</a:t>
+              <a:t>12/12/20</a:t>
             </a:fld>
             <a:endParaRPr lang="en-US" dirty="0"/>
           </a:p>
@@ -2114,7 +2114,7 @@
           <a:p>
             <a:fld id="{4F7D4976-E339-4826-83B7-FBD03F55ECF8}" type="datetimeFigureOut">
               <a:rPr lang="en-US" dirty="0"/>
-              <a:t>11/11/20</a:t>
+              <a:t>12/12/20</a:t>
             </a:fld>
             <a:endParaRPr lang="en-US" dirty="0"/>
           </a:p>
@@ -2250,7 +2250,7 @@
           <a:p>
             <a:fld id="{E1037C31-9E7A-4F99-8774-A0E530DE1A42}" type="datetimeFigureOut">
               <a:rPr lang="en-US" dirty="0"/>
-              <a:t>11/11/20</a:t>
+              <a:t>12/12/20</a:t>
             </a:fld>
             <a:endParaRPr lang="en-US" dirty="0"/>
           </a:p>
@@ -2340,7 +2340,7 @@
           <a:p>
             <a:fld id="{C278504F-A551-4DE0-9316-4DCD1D8CC752}" type="datetimeFigureOut">
               <a:rPr lang="en-US" dirty="0"/>
-              <a:t>11/11/20</a:t>
+              <a:t>12/12/20</a:t>
             </a:fld>
             <a:endParaRPr lang="en-US" dirty="0"/>
           </a:p>
@@ -2692,7 +2692,7 @@
           <a:p>
             <a:fld id="{D1BE4249-C0D0-4B06-8692-E8BB871AF643}" type="datetimeFigureOut">
               <a:rPr lang="en-US" dirty="0"/>
-              <a:t>11/11/20</a:t>
+              <a:t>12/12/20</a:t>
             </a:fld>
             <a:endParaRPr lang="en-US" dirty="0"/>
           </a:p>
@@ -3044,7 +3044,7 @@
           <a:p>
             <a:fld id="{042B0DB6-F5C7-45FB-8CF3-31B45F9C2DAC}" type="datetimeFigureOut">
               <a:rPr lang="en-US" dirty="0"/>
-              <a:t>11/11/20</a:t>
+              <a:t>12/12/20</a:t>
             </a:fld>
             <a:endParaRPr lang="en-US" dirty="0"/>
           </a:p>
@@ -3281,7 +3281,7 @@
           <a:p>
             <a:fld id="{1160EA64-D806-43AC-9DF2-F8C432F32B4C}" type="datetimeFigureOut">
               <a:rPr lang="en-US" dirty="0"/>
-              <a:t>11/11/20</a:t>
+              <a:t>12/12/20</a:t>
             </a:fld>
             <a:endParaRPr lang="en-US" dirty="0"/>
           </a:p>
@@ -5264,7 +5264,7 @@
         </p:blipFill>
         <p:spPr>
           <a:xfrm>
-            <a:off x="6610865" y="1514643"/>
+            <a:off x="6814065" y="1387417"/>
             <a:ext cx="4632302" cy="5144660"/>
           </a:xfrm>
           <a:prstGeom prst="rect">
@@ -5795,8 +5795,8 @@
           </a:prstGeom>
         </p:spPr>
       </p:pic>
-      <mc:AlternateContent xmlns:mc="http://schemas.openxmlformats.org/markup-compatibility/2006">
-        <mc:Choice xmlns:p14="http://schemas.microsoft.com/office/powerpoint/2010/main" Requires="p14">
+      <mc:AlternateContent xmlns:mc="http://schemas.openxmlformats.org/markup-compatibility/2006" xmlns:p14="http://schemas.microsoft.com/office/powerpoint/2010/main">
+        <mc:Choice Requires="p14">
           <p:contentPart p14:bwMode="auto" r:id="rId3">
             <p14:nvContentPartPr>
               <p14:cNvPr id="4" name="Ink 3">
@@ -5815,7 +5815,7 @@
             </p14:xfrm>
           </p:contentPart>
         </mc:Choice>
-        <mc:Fallback>
+        <mc:Fallback xmlns="">
           <p:pic>
             <p:nvPicPr>
               <p:cNvPr id="4" name="Ink 3">
@@ -6052,8 +6052,8 @@
           </a:prstGeom>
         </p:spPr>
       </p:pic>
-      <mc:AlternateContent xmlns:mc="http://schemas.openxmlformats.org/markup-compatibility/2006">
-        <mc:Choice xmlns:p14="http://schemas.microsoft.com/office/powerpoint/2010/main" Requires="p14">
+      <mc:AlternateContent xmlns:mc="http://schemas.openxmlformats.org/markup-compatibility/2006" xmlns:p14="http://schemas.microsoft.com/office/powerpoint/2010/main">
+        <mc:Choice Requires="p14">
           <p:contentPart p14:bwMode="auto" r:id="rId4">
             <p14:nvContentPartPr>
               <p14:cNvPr id="4" name="Ink 3">
@@ -6072,7 +6072,7 @@
             </p14:xfrm>
           </p:contentPart>
         </mc:Choice>
-        <mc:Fallback>
+        <mc:Fallback xmlns="">
           <p:pic>
             <p:nvPicPr>
               <p:cNvPr id="4" name="Ink 3">
@@ -6417,8 +6417,8 @@
           </a:prstGeom>
         </p:spPr>
       </p:pic>
-      <mc:AlternateContent xmlns:mc="http://schemas.openxmlformats.org/markup-compatibility/2006">
-        <mc:Choice xmlns:p14="http://schemas.microsoft.com/office/powerpoint/2010/main" Requires="p14">
+      <mc:AlternateContent xmlns:mc="http://schemas.openxmlformats.org/markup-compatibility/2006" xmlns:p14="http://schemas.microsoft.com/office/powerpoint/2010/main">
+        <mc:Choice Requires="p14">
           <p:contentPart p14:bwMode="auto" r:id="rId6">
             <p14:nvContentPartPr>
               <p14:cNvPr id="2" name="Ink 1">
@@ -6437,7 +6437,7 @@
             </p14:xfrm>
           </p:contentPart>
         </mc:Choice>
-        <mc:Fallback>
+        <mc:Fallback xmlns="">
           <p:pic>
             <p:nvPicPr>
               <p:cNvPr id="2" name="Ink 1">

</xml_diff>